<commit_message>
se escalo el cabezote
</commit_message>
<xml_diff>
--- a/images/cabezote.pptx
+++ b/images/cabezote.pptx
@@ -3170,8 +3170,8 @@
                 <a:ln>
                   <a:solidFill>
                     <a:schemeClr val="tx1">
-                      <a:lumMod val="65000"/>
-                      <a:lumOff val="35000"/>
+                      <a:lumMod val="95000"/>
+                      <a:lumOff val="5000"/>
                     </a:schemeClr>
                   </a:solidFill>
                 </a:ln>
@@ -3193,8 +3193,8 @@
                 <a:ln>
                   <a:solidFill>
                     <a:schemeClr val="tx1">
-                      <a:lumMod val="65000"/>
-                      <a:lumOff val="35000"/>
+                      <a:lumMod val="95000"/>
+                      <a:lumOff val="5000"/>
                     </a:schemeClr>
                   </a:solidFill>
                 </a:ln>
@@ -3218,8 +3218,8 @@
               <a:ln>
                 <a:solidFill>
                   <a:schemeClr val="tx1">
-                    <a:lumMod val="65000"/>
-                    <a:lumOff val="35000"/>
+                    <a:lumMod val="95000"/>
+                    <a:lumOff val="5000"/>
                   </a:schemeClr>
                 </a:solidFill>
               </a:ln>
@@ -3242,8 +3242,8 @@
                 <a:ln>
                   <a:solidFill>
                     <a:schemeClr val="tx1">
-                      <a:lumMod val="65000"/>
-                      <a:lumOff val="35000"/>
+                      <a:lumMod val="95000"/>
+                      <a:lumOff val="5000"/>
                     </a:schemeClr>
                   </a:solidFill>
                 </a:ln>
@@ -3265,8 +3265,8 @@
                 <a:ln>
                   <a:solidFill>
                     <a:schemeClr val="tx1">
-                      <a:lumMod val="65000"/>
-                      <a:lumOff val="35000"/>
+                      <a:lumMod val="95000"/>
+                      <a:lumOff val="5000"/>
                     </a:schemeClr>
                   </a:solidFill>
                 </a:ln>
@@ -3287,8 +3287,8 @@
               <a:ln>
                 <a:solidFill>
                   <a:schemeClr val="tx1">
-                    <a:lumMod val="65000"/>
-                    <a:lumOff val="35000"/>
+                    <a:lumMod val="95000"/>
+                    <a:lumOff val="5000"/>
                   </a:schemeClr>
                 </a:solidFill>
               </a:ln>

</xml_diff>